<commit_message>
user to user similarity calculation using FAISS GPU
</commit_message>
<xml_diff>
--- a/Model/lookalike-model/tests/faiss_distance_cal_gpu/GPU_Based_distance_cal.pptx
+++ b/Model/lookalike-model/tests/faiss_distance_cal_gpu/GPU_Based_distance_cal.pptx
@@ -2,26 +2,25 @@
 <file path=ppt/presentation.xml><?xml version="1.0" encoding="utf-8"?>
 <p:presentation xmlns:a="http://schemas.openxmlformats.org/drawingml/2006/main" xmlns:r="http://schemas.openxmlformats.org/officeDocument/2006/relationships" xmlns:p="http://schemas.openxmlformats.org/presentationml/2006/main" saveSubsetFonts="1">
   <p:sldMasterIdLst>
-    <p:sldMasterId id="2147483818" r:id="rId1"/>
-    <p:sldMasterId id="2147483797" r:id="rId2"/>
-    <p:sldMasterId id="2147483892" r:id="rId3"/>
+    <p:sldMasterId id="2147483797" r:id="rId1"/>
+    <p:sldMasterId id="2147483892" r:id="rId2"/>
   </p:sldMasterIdLst>
   <p:notesMasterIdLst>
-    <p:notesMasterId r:id="rId8"/>
+    <p:notesMasterId r:id="rId7"/>
   </p:notesMasterIdLst>
   <p:handoutMasterIdLst>
-    <p:handoutMasterId r:id="rId9"/>
+    <p:handoutMasterId r:id="rId8"/>
   </p:handoutMasterIdLst>
   <p:sldIdLst>
-    <p:sldId id="283" r:id="rId4"/>
-    <p:sldId id="327" r:id="rId5"/>
-    <p:sldId id="337" r:id="rId6"/>
-    <p:sldId id="338" r:id="rId7"/>
+    <p:sldId id="339" r:id="rId3"/>
+    <p:sldId id="327" r:id="rId4"/>
+    <p:sldId id="337" r:id="rId5"/>
+    <p:sldId id="338" r:id="rId6"/>
   </p:sldIdLst>
   <p:sldSz cx="12196763" cy="6858000"/>
   <p:notesSz cx="6858000" cy="9144000"/>
   <p:custDataLst>
-    <p:tags r:id="rId10"/>
+    <p:tags r:id="rId9"/>
   </p:custDataLst>
   <p:defaultTextStyle>
     <a:defPPr>
@@ -172,7 +171,7 @@
           <p:cNvPr id="2" name="Header Placeholder 1">
             <a:extLst>
               <a:ext uri="{FF2B5EF4-FFF2-40B4-BE49-F238E27FC236}">
-                <a16:creationId xmlns="" xmlns:a16="http://schemas.microsoft.com/office/drawing/2014/main" xmlns:a14="http://schemas.microsoft.com/office/drawing/2010/main" xmlns:p14="http://schemas.microsoft.com/office/powerpoint/2010/main" id="{8CC198DB-AFBD-584A-8986-364FF2B03F46}"/>
+                <a16:creationId xmlns:p14="http://schemas.microsoft.com/office/powerpoint/2010/main" xmlns:a14="http://schemas.microsoft.com/office/drawing/2010/main" xmlns:a16="http://schemas.microsoft.com/office/drawing/2014/main" xmlns="" id="{8CC198DB-AFBD-584A-8986-364FF2B03F46}"/>
               </a:ext>
             </a:extLst>
           </p:cNvPr>
@@ -209,7 +208,7 @@
           <p:cNvPr id="3" name="Date Placeholder 2">
             <a:extLst>
               <a:ext uri="{FF2B5EF4-FFF2-40B4-BE49-F238E27FC236}">
-                <a16:creationId xmlns="" xmlns:a16="http://schemas.microsoft.com/office/drawing/2014/main" xmlns:a14="http://schemas.microsoft.com/office/drawing/2010/main" xmlns:p14="http://schemas.microsoft.com/office/powerpoint/2010/main" id="{AD01315C-523F-A043-8029-B9921497126E}"/>
+                <a16:creationId xmlns:p14="http://schemas.microsoft.com/office/powerpoint/2010/main" xmlns:a14="http://schemas.microsoft.com/office/drawing/2010/main" xmlns:a16="http://schemas.microsoft.com/office/drawing/2014/main" xmlns="" id="{AD01315C-523F-A043-8029-B9921497126E}"/>
               </a:ext>
             </a:extLst>
           </p:cNvPr>
@@ -250,7 +249,7 @@
           <p:cNvPr id="4" name="Footer Placeholder 3">
             <a:extLst>
               <a:ext uri="{FF2B5EF4-FFF2-40B4-BE49-F238E27FC236}">
-                <a16:creationId xmlns="" xmlns:a16="http://schemas.microsoft.com/office/drawing/2014/main" xmlns:a14="http://schemas.microsoft.com/office/drawing/2010/main" xmlns:p14="http://schemas.microsoft.com/office/powerpoint/2010/main" id="{B9601424-70F4-1643-8E3A-557A0258D6B6}"/>
+                <a16:creationId xmlns:p14="http://schemas.microsoft.com/office/powerpoint/2010/main" xmlns:a14="http://schemas.microsoft.com/office/drawing/2010/main" xmlns:a16="http://schemas.microsoft.com/office/drawing/2014/main" xmlns="" id="{B9601424-70F4-1643-8E3A-557A0258D6B6}"/>
               </a:ext>
             </a:extLst>
           </p:cNvPr>
@@ -287,7 +286,7 @@
           <p:cNvPr id="5" name="Slide Number Placeholder 4">
             <a:extLst>
               <a:ext uri="{FF2B5EF4-FFF2-40B4-BE49-F238E27FC236}">
-                <a16:creationId xmlns="" xmlns:a16="http://schemas.microsoft.com/office/drawing/2014/main" xmlns:a14="http://schemas.microsoft.com/office/drawing/2010/main" xmlns:p14="http://schemas.microsoft.com/office/powerpoint/2010/main" id="{E85BF48A-FF5C-8145-95A7-EE66A87C73DF}"/>
+                <a16:creationId xmlns:p14="http://schemas.microsoft.com/office/powerpoint/2010/main" xmlns:a14="http://schemas.microsoft.com/office/drawing/2010/main" xmlns:a16="http://schemas.microsoft.com/office/drawing/2014/main" xmlns="" id="{E85BF48A-FF5C-8145-95A7-EE66A87C73DF}"/>
               </a:ext>
             </a:extLst>
           </p:cNvPr>
@@ -677,8 +676,8 @@
 </file>
 
 <file path=ppt/slideLayouts/slideLayout1.xml><?xml version="1.0" encoding="utf-8"?>
-<p:sldLayout xmlns:a="http://schemas.openxmlformats.org/drawingml/2006/main" xmlns:r="http://schemas.openxmlformats.org/officeDocument/2006/relationships" xmlns:p="http://schemas.openxmlformats.org/presentationml/2006/main" preserve="1" userDrawn="1">
-  <p:cSld name="探索">
+<p:sldLayout xmlns:a="http://schemas.openxmlformats.org/drawingml/2006/main" xmlns:r="http://schemas.openxmlformats.org/officeDocument/2006/relationships" xmlns:p="http://schemas.openxmlformats.org/presentationml/2006/main" userDrawn="1">
+  <p:cSld name="1_Chinese text page">
     <p:spTree>
       <p:nvGrpSpPr>
         <p:cNvPr id="1" name=""/>
@@ -693,91 +692,12 @@
           <a:chExt cx="0" cy="0"/>
         </a:xfrm>
       </p:grpSpPr>
-      <p:pic>
-        <p:nvPicPr>
-          <p:cNvPr id="4" name="图片 3"/>
-          <p:cNvPicPr>
-            <a:picLocks noChangeAspect="1"/>
-          </p:cNvPicPr>
-          <p:nvPr userDrawn="1"/>
-        </p:nvPicPr>
-        <p:blipFill>
-          <a:blip r:embed="rId2">
-            <a:extLst>
-              <a:ext uri="{28A0092B-C50C-407E-A947-70E740481C1C}">
-                <a14:useLocalDpi xmlns:a14="http://schemas.microsoft.com/office/drawing/2010/main"/>
-              </a:ext>
-            </a:extLst>
-          </a:blip>
-          <a:stretch>
-            <a:fillRect/>
-          </a:stretch>
-        </p:blipFill>
-        <p:spPr>
-          <a:xfrm>
-            <a:off x="1" y="0"/>
-            <a:ext cx="12196763" cy="5602265"/>
-          </a:xfrm>
-          <a:prstGeom prst="rect">
-            <a:avLst/>
-          </a:prstGeom>
-        </p:spPr>
-      </p:pic>
       <p:sp>
         <p:nvSpPr>
-          <p:cNvPr id="7" name="L 形 6"/>
-          <p:cNvSpPr/>
-          <p:nvPr userDrawn="1"/>
-        </p:nvSpPr>
-        <p:spPr>
-          <a:xfrm rot="5400000">
-            <a:off x="7853942" y="2130562"/>
-            <a:ext cx="701032" cy="717936"/>
-          </a:xfrm>
-          <a:prstGeom prst="corner">
-            <a:avLst>
-              <a:gd name="adj1" fmla="val 3243"/>
-              <a:gd name="adj2" fmla="val 3048"/>
-            </a:avLst>
-          </a:prstGeom>
-          <a:solidFill>
-            <a:srgbClr val="C7000B"/>
-          </a:solidFill>
-          <a:ln>
-            <a:noFill/>
-          </a:ln>
-        </p:spPr>
-        <p:style>
-          <a:lnRef idx="2">
-            <a:schemeClr val="accent1">
-              <a:shade val="50000"/>
-            </a:schemeClr>
-          </a:lnRef>
-          <a:fillRef idx="1">
-            <a:schemeClr val="accent1"/>
-          </a:fillRef>
-          <a:effectRef idx="0">
-            <a:schemeClr val="accent1"/>
-          </a:effectRef>
-          <a:fontRef idx="minor">
-            <a:schemeClr val="lt1"/>
-          </a:fontRef>
-        </p:style>
-        <p:txBody>
-          <a:bodyPr rtlCol="0" anchor="ctr"/>
-          <a:lstStyle/>
-          <a:p>
-            <a:pPr algn="ctr"/>
-            <a:endParaRPr kumimoji="1" lang="zh-CN" altLang="en-US" sz="900"/>
-          </a:p>
-        </p:txBody>
-      </p:sp>
-      <p:sp>
-        <p:nvSpPr>
-          <p:cNvPr id="10" name="Title 1">
+          <p:cNvPr id="3" name="Subtitle 2">
             <a:extLst>
               <a:ext uri="{FF2B5EF4-FFF2-40B4-BE49-F238E27FC236}">
-                <a16:creationId xmlns="" xmlns:a16="http://schemas.microsoft.com/office/drawing/2014/main" xmlns:p159="http://schemas.microsoft.com/office/powerpoint/2015/09/main" xmlns:p15="http://schemas.microsoft.com/office/powerpoint/2012/main" xmlns:a14="http://schemas.microsoft.com/office/drawing/2010/main" xmlns:p14="http://schemas.microsoft.com/office/powerpoint/2010/main" id="{8227DEE9-8BE9-0D49-BF96-9E83C5312E00}"/>
+                <a16:creationId xmlns:p14="http://schemas.microsoft.com/office/powerpoint/2010/main" xmlns:a14="http://schemas.microsoft.com/office/drawing/2010/main" xmlns:p15="http://schemas.microsoft.com/office/powerpoint/2012/main" xmlns:p159="http://schemas.microsoft.com/office/powerpoint/2015/09/main" xmlns:a16="http://schemas.microsoft.com/office/drawing/2014/main" xmlns="" id="{D2A38214-5857-FC4E-B923-056100E16BCA}"/>
               </a:ext>
             </a:extLst>
           </p:cNvPr>
@@ -785,29 +705,32 @@
             <a:spLocks noGrp="1"/>
           </p:cNvSpPr>
           <p:nvPr>
-            <p:ph type="ctrTitle" hasCustomPrompt="1"/>
+            <p:ph type="subTitle" idx="1" hasCustomPrompt="1"/>
           </p:nvPr>
         </p:nvSpPr>
         <p:spPr>
           <a:xfrm>
-            <a:off x="898996" y="907092"/>
-            <a:ext cx="6559809" cy="690255"/>
+            <a:off x="729175" y="456134"/>
+            <a:ext cx="10740640" cy="993400"/>
           </a:xfrm>
           <a:prstGeom prst="rect">
             <a:avLst/>
           </a:prstGeom>
-          <a:ln>
-            <a:noFill/>
-            <a:prstDash val="dash"/>
-          </a:ln>
         </p:spPr>
         <p:txBody>
           <a:bodyPr lIns="0" tIns="0" rIns="0" bIns="0" anchor="t">
             <a:normAutofit/>
           </a:bodyPr>
           <a:lstStyle>
-            <a:lvl1pPr algn="l">
-              <a:defRPr sz="3200" b="0" i="0">
+            <a:lvl1pPr marL="0" indent="0" algn="l">
+              <a:lnSpc>
+                <a:spcPts val="3430"/>
+              </a:lnSpc>
+              <a:spcBef>
+                <a:spcPct val="0"/>
+              </a:spcBef>
+              <a:buNone/>
+              <a:defRPr sz="3200" baseline="0">
                 <a:solidFill>
                   <a:schemeClr val="tx1"/>
                 </a:solidFill>
@@ -815,6 +738,38 @@
                 <a:ea typeface="Microsoft YaHei" panose="020B0503020204020204" pitchFamily="34" charset="-122"/>
               </a:defRPr>
             </a:lvl1pPr>
+            <a:lvl2pPr marL="593900" indent="0" algn="ctr">
+              <a:buNone/>
+              <a:defRPr sz="2598"/>
+            </a:lvl2pPr>
+            <a:lvl3pPr marL="1187798" indent="0" algn="ctr">
+              <a:buNone/>
+              <a:defRPr sz="2338"/>
+            </a:lvl3pPr>
+            <a:lvl4pPr marL="1781699" indent="0" algn="ctr">
+              <a:buNone/>
+              <a:defRPr sz="2079"/>
+            </a:lvl4pPr>
+            <a:lvl5pPr marL="2375598" indent="0" algn="ctr">
+              <a:buNone/>
+              <a:defRPr sz="2079"/>
+            </a:lvl5pPr>
+            <a:lvl6pPr marL="2969497" indent="0" algn="ctr">
+              <a:buNone/>
+              <a:defRPr sz="2079"/>
+            </a:lvl6pPr>
+            <a:lvl7pPr marL="3563396" indent="0" algn="ctr">
+              <a:buNone/>
+              <a:defRPr sz="2079"/>
+            </a:lvl7pPr>
+            <a:lvl8pPr marL="4157297" indent="0" algn="ctr">
+              <a:buNone/>
+              <a:defRPr sz="2079"/>
+            </a:lvl8pPr>
+            <a:lvl9pPr marL="4751195" indent="0" algn="ctr">
+              <a:buNone/>
+              <a:defRPr sz="2079"/>
+            </a:lvl9pPr>
           </a:lstStyle>
           <a:p>
             <a:r>
@@ -827,10 +782,10 @@
       </p:sp>
       <p:sp>
         <p:nvSpPr>
-          <p:cNvPr id="6" name="Text Placeholder 5">
+          <p:cNvPr id="7" name="Content Placeholder 2">
             <a:extLst>
               <a:ext uri="{FF2B5EF4-FFF2-40B4-BE49-F238E27FC236}">
-                <a16:creationId xmlns="" xmlns:a16="http://schemas.microsoft.com/office/drawing/2014/main" xmlns:p159="http://schemas.microsoft.com/office/powerpoint/2015/09/main" xmlns:p15="http://schemas.microsoft.com/office/powerpoint/2012/main" xmlns:a14="http://schemas.microsoft.com/office/drawing/2010/main" xmlns:p14="http://schemas.microsoft.com/office/powerpoint/2010/main" id="{2F43DA98-D48D-6947-95EF-BA3B05E68822}"/>
+                <a16:creationId xmlns:p14="http://schemas.microsoft.com/office/powerpoint/2010/main" xmlns:a14="http://schemas.microsoft.com/office/drawing/2010/main" xmlns:p15="http://schemas.microsoft.com/office/powerpoint/2012/main" xmlns:p159="http://schemas.microsoft.com/office/powerpoint/2015/09/main" xmlns:a16="http://schemas.microsoft.com/office/drawing/2014/main" xmlns="" id="{8A4EAA63-3827-DA40-B921-C01084B9DA87}"/>
               </a:ext>
             </a:extLst>
           </p:cNvPr>
@@ -838,25 +793,74 @@
             <a:spLocks noGrp="1"/>
           </p:cNvSpPr>
           <p:nvPr>
-            <p:ph type="body" sz="quarter" idx="10" hasCustomPrompt="1"/>
+            <p:ph idx="10" hasCustomPrompt="1"/>
           </p:nvPr>
         </p:nvSpPr>
         <p:spPr>
           <a:xfrm>
-            <a:off x="929260" y="1949372"/>
-            <a:ext cx="6535842" cy="643926"/>
+            <a:off x="736908" y="1501989"/>
+            <a:ext cx="10733557" cy="4690459"/>
           </a:xfrm>
+          <a:prstGeom prst="rect">
+            <a:avLst/>
+          </a:prstGeom>
         </p:spPr>
         <p:txBody>
-          <a:bodyPr/>
+          <a:bodyPr lIns="0" tIns="0" rIns="0" bIns="0"/>
           <a:lstStyle>
-            <a:lvl1pPr>
-              <a:defRPr sz="1400">
+            <a:lvl1pPr marL="12373" indent="0">
+              <a:lnSpc>
+                <a:spcPct val="100000"/>
+              </a:lnSpc>
+              <a:spcBef>
+                <a:spcPct val="0"/>
+              </a:spcBef>
+              <a:buFontTx/>
+              <a:buNone/>
+              <a:tabLst>
+                <a:tab pos="1208420" algn="ctr"/>
+              </a:tabLst>
+              <a:defRPr sz="1800" baseline="0">
                 <a:solidFill>
                   <a:schemeClr val="tx1"/>
                 </a:solidFill>
+                <a:latin typeface="Microsoft YaHei" panose="020B0503020204020204" pitchFamily="34" charset="-122"/>
+                <a:ea typeface="Microsoft YaHei" panose="020B0503020204020204" pitchFamily="34" charset="-122"/>
+                <a:cs typeface="Arial" panose="020B0604020202020204" pitchFamily="34" charset="0"/>
               </a:defRPr>
             </a:lvl1pPr>
+            <a:lvl2pPr marL="525850" indent="-171159">
+              <a:buFont typeface="Arial" panose="020B0604020202020204" pitchFamily="34" charset="0"/>
+              <a:buChar char="•"/>
+              <a:tabLst>
+                <a:tab pos="1208420" algn="ctr"/>
+              </a:tabLst>
+              <a:defRPr sz="1299" baseline="0"/>
+            </a:lvl2pPr>
+            <a:lvl3pPr marL="525850" indent="-171159">
+              <a:buFont typeface="Arial" panose="020B0604020202020204" pitchFamily="34" charset="0"/>
+              <a:buChar char="•"/>
+              <a:tabLst>
+                <a:tab pos="1208420" algn="ctr"/>
+              </a:tabLst>
+              <a:defRPr sz="1299" baseline="0"/>
+            </a:lvl3pPr>
+            <a:lvl4pPr marL="525850" indent="-171159">
+              <a:buFont typeface="Arial" panose="020B0604020202020204" pitchFamily="34" charset="0"/>
+              <a:buChar char="•"/>
+              <a:tabLst>
+                <a:tab pos="1208420" algn="ctr"/>
+              </a:tabLst>
+              <a:defRPr sz="1299" baseline="0"/>
+            </a:lvl4pPr>
+            <a:lvl5pPr marL="525850" indent="-171159">
+              <a:buFont typeface="Arial" panose="020B0604020202020204" pitchFamily="34" charset="0"/>
+              <a:buChar char="•"/>
+              <a:tabLst>
+                <a:tab pos="1208420" algn="ctr"/>
+              </a:tabLst>
+              <a:defRPr sz="1299" baseline="0"/>
+            </a:lvl5pPr>
           </a:lstStyle>
           <a:p>
             <a:pPr lvl="0"/>
@@ -871,7 +875,7 @@
     </p:spTree>
     <p:extLst>
       <p:ext uri="{BB962C8B-B14F-4D97-AF65-F5344CB8AC3E}">
-        <p14:creationId xmlns:p14="http://schemas.microsoft.com/office/powerpoint/2010/main" val="1651949536"/>
+        <p14:creationId xmlns:p14="http://schemas.microsoft.com/office/powerpoint/2010/main" val="4210683866"/>
       </p:ext>
     </p:extLst>
   </p:cSld>
@@ -882,7 +886,7 @@
   <p:extLst mod="1">
     <p:ext uri="{DCECCB84-F9BA-43D5-87BE-67443E8EF086}">
       <p15:sldGuideLst xmlns:p15="http://schemas.microsoft.com/office/powerpoint/2012/main">
-        <p15:guide id="1" orient="horz" pos="3414" userDrawn="1">
+        <p15:guide id="4294967295" pos="3842">
           <p15:clr>
             <a:srgbClr val="FBAE40"/>
           </p15:clr>
@@ -994,7 +998,7 @@
           <p:cNvPr id="8" name="Title 1">
             <a:extLst>
               <a:ext uri="{FF2B5EF4-FFF2-40B4-BE49-F238E27FC236}">
-                <a16:creationId xmlns="" xmlns:a16="http://schemas.microsoft.com/office/drawing/2014/main" xmlns:p159="http://schemas.microsoft.com/office/powerpoint/2015/09/main" xmlns:p15="http://schemas.microsoft.com/office/powerpoint/2012/main" xmlns:a14="http://schemas.microsoft.com/office/drawing/2010/main" xmlns:p14="http://schemas.microsoft.com/office/powerpoint/2010/main" id="{62AA4863-E1EF-3342-A8CB-ECD4FD06CEB7}"/>
+                <a16:creationId xmlns:p14="http://schemas.microsoft.com/office/powerpoint/2010/main" xmlns:a14="http://schemas.microsoft.com/office/drawing/2010/main" xmlns:p15="http://schemas.microsoft.com/office/powerpoint/2012/main" xmlns:p159="http://schemas.microsoft.com/office/powerpoint/2015/09/main" xmlns:a16="http://schemas.microsoft.com/office/drawing/2014/main" xmlns="" id="{62AA4863-E1EF-3342-A8CB-ECD4FD06CEB7}"/>
               </a:ext>
             </a:extLst>
           </p:cNvPr>
@@ -1043,7 +1047,7 @@
           <p:cNvPr id="5" name="Text Placeholder 5">
             <a:extLst>
               <a:ext uri="{FF2B5EF4-FFF2-40B4-BE49-F238E27FC236}">
-                <a16:creationId xmlns="" xmlns:a16="http://schemas.microsoft.com/office/drawing/2014/main" xmlns:p159="http://schemas.microsoft.com/office/powerpoint/2015/09/main" xmlns:p15="http://schemas.microsoft.com/office/powerpoint/2012/main" xmlns:a14="http://schemas.microsoft.com/office/drawing/2010/main" xmlns:p14="http://schemas.microsoft.com/office/powerpoint/2010/main" id="{195303EA-8491-464F-99A0-67F948701C12}"/>
+                <a16:creationId xmlns:p14="http://schemas.microsoft.com/office/powerpoint/2010/main" xmlns:a14="http://schemas.microsoft.com/office/drawing/2010/main" xmlns:p15="http://schemas.microsoft.com/office/powerpoint/2012/main" xmlns:p159="http://schemas.microsoft.com/office/powerpoint/2015/09/main" xmlns:a16="http://schemas.microsoft.com/office/drawing/2014/main" xmlns="" id="{195303EA-8491-464F-99A0-67F948701C12}"/>
               </a:ext>
             </a:extLst>
           </p:cNvPr>
@@ -1059,6 +1063,9 @@
             <a:off x="929260" y="1949372"/>
             <a:ext cx="6535842" cy="643926"/>
           </a:xfrm>
+          <a:prstGeom prst="rect">
+            <a:avLst/>
+          </a:prstGeom>
         </p:spPr>
         <p:txBody>
           <a:bodyPr/>
@@ -1122,7 +1129,7 @@
           <p:cNvPr id="8" name="图片 3">
             <a:extLst>
               <a:ext uri="{FF2B5EF4-FFF2-40B4-BE49-F238E27FC236}">
-                <a16:creationId xmlns="" xmlns:a16="http://schemas.microsoft.com/office/drawing/2014/main" xmlns:p159="http://schemas.microsoft.com/office/powerpoint/2015/09/main" xmlns:p15="http://schemas.microsoft.com/office/powerpoint/2012/main" xmlns:a14="http://schemas.microsoft.com/office/drawing/2010/main" xmlns:p14="http://schemas.microsoft.com/office/powerpoint/2010/main" id="{C6D010F9-02DE-1949-B177-A4E0D2774EDA}"/>
+                <a16:creationId xmlns:p14="http://schemas.microsoft.com/office/powerpoint/2010/main" xmlns:a14="http://schemas.microsoft.com/office/drawing/2010/main" xmlns:p15="http://schemas.microsoft.com/office/powerpoint/2012/main" xmlns:p159="http://schemas.microsoft.com/office/powerpoint/2015/09/main" xmlns:a16="http://schemas.microsoft.com/office/drawing/2014/main" xmlns="" id="{C6D010F9-02DE-1949-B177-A4E0D2774EDA}"/>
               </a:ext>
             </a:extLst>
           </p:cNvPr>
@@ -1159,7 +1166,7 @@
           <p:cNvPr id="10" name="L 形 10">
             <a:extLst>
               <a:ext uri="{FF2B5EF4-FFF2-40B4-BE49-F238E27FC236}">
-                <a16:creationId xmlns="" xmlns:a16="http://schemas.microsoft.com/office/drawing/2014/main" xmlns:p159="http://schemas.microsoft.com/office/powerpoint/2015/09/main" xmlns:p15="http://schemas.microsoft.com/office/powerpoint/2012/main" xmlns:a14="http://schemas.microsoft.com/office/drawing/2010/main" xmlns:p14="http://schemas.microsoft.com/office/powerpoint/2010/main" id="{0C595D57-06EA-3B46-AF21-C0EACD8F1C4E}"/>
+                <a16:creationId xmlns:p14="http://schemas.microsoft.com/office/powerpoint/2010/main" xmlns:a14="http://schemas.microsoft.com/office/drawing/2010/main" xmlns:p15="http://schemas.microsoft.com/office/powerpoint/2012/main" xmlns:p159="http://schemas.microsoft.com/office/powerpoint/2015/09/main" xmlns:a16="http://schemas.microsoft.com/office/drawing/2014/main" xmlns="" id="{0C595D57-06EA-3B46-AF21-C0EACD8F1C4E}"/>
               </a:ext>
             </a:extLst>
           </p:cNvPr>
@@ -1214,7 +1221,7 @@
           <p:cNvPr id="11" name="Title 1">
             <a:extLst>
               <a:ext uri="{FF2B5EF4-FFF2-40B4-BE49-F238E27FC236}">
-                <a16:creationId xmlns="" xmlns:a16="http://schemas.microsoft.com/office/drawing/2014/main" xmlns:p159="http://schemas.microsoft.com/office/powerpoint/2015/09/main" xmlns:p15="http://schemas.microsoft.com/office/powerpoint/2012/main" xmlns:a14="http://schemas.microsoft.com/office/drawing/2010/main" xmlns:p14="http://schemas.microsoft.com/office/powerpoint/2010/main" id="{C897A368-8F39-4049-9BB0-AEB315EB7E0D}"/>
+                <a16:creationId xmlns:p14="http://schemas.microsoft.com/office/powerpoint/2010/main" xmlns:a14="http://schemas.microsoft.com/office/drawing/2010/main" xmlns:p15="http://schemas.microsoft.com/office/powerpoint/2012/main" xmlns:p159="http://schemas.microsoft.com/office/powerpoint/2015/09/main" xmlns:a16="http://schemas.microsoft.com/office/drawing/2014/main" xmlns="" id="{C897A368-8F39-4049-9BB0-AEB315EB7E0D}"/>
               </a:ext>
             </a:extLst>
           </p:cNvPr>
@@ -1263,7 +1270,7 @@
           <p:cNvPr id="5" name="Text Placeholder 5">
             <a:extLst>
               <a:ext uri="{FF2B5EF4-FFF2-40B4-BE49-F238E27FC236}">
-                <a16:creationId xmlns="" xmlns:a16="http://schemas.microsoft.com/office/drawing/2014/main" xmlns:p159="http://schemas.microsoft.com/office/powerpoint/2015/09/main" xmlns:p15="http://schemas.microsoft.com/office/powerpoint/2012/main" xmlns:a14="http://schemas.microsoft.com/office/drawing/2010/main" xmlns:p14="http://schemas.microsoft.com/office/powerpoint/2010/main" id="{12621051-E1A4-A049-BF21-61B18B348315}"/>
+                <a16:creationId xmlns:p14="http://schemas.microsoft.com/office/powerpoint/2010/main" xmlns:a14="http://schemas.microsoft.com/office/drawing/2010/main" xmlns:p15="http://schemas.microsoft.com/office/powerpoint/2012/main" xmlns:p159="http://schemas.microsoft.com/office/powerpoint/2015/09/main" xmlns:a16="http://schemas.microsoft.com/office/drawing/2014/main" xmlns="" id="{12621051-E1A4-A049-BF21-61B18B348315}"/>
               </a:ext>
             </a:extLst>
           </p:cNvPr>
@@ -1279,6 +1286,9 @@
             <a:off x="929260" y="1949372"/>
             <a:ext cx="6535842" cy="643926"/>
           </a:xfrm>
+          <a:prstGeom prst="rect">
+            <a:avLst/>
+          </a:prstGeom>
         </p:spPr>
         <p:txBody>
           <a:bodyPr/>
@@ -1421,7 +1431,7 @@
           <p:cNvPr id="8" name="Title 1">
             <a:extLst>
               <a:ext uri="{FF2B5EF4-FFF2-40B4-BE49-F238E27FC236}">
-                <a16:creationId xmlns="" xmlns:a16="http://schemas.microsoft.com/office/drawing/2014/main" xmlns:p159="http://schemas.microsoft.com/office/powerpoint/2015/09/main" xmlns:p15="http://schemas.microsoft.com/office/powerpoint/2012/main" xmlns:a14="http://schemas.microsoft.com/office/drawing/2010/main" xmlns:p14="http://schemas.microsoft.com/office/powerpoint/2010/main" id="{FB908F03-BBCC-164B-BE54-2E836D6E7C14}"/>
+                <a16:creationId xmlns:p14="http://schemas.microsoft.com/office/powerpoint/2010/main" xmlns:a14="http://schemas.microsoft.com/office/drawing/2010/main" xmlns:p15="http://schemas.microsoft.com/office/powerpoint/2012/main" xmlns:p159="http://schemas.microsoft.com/office/powerpoint/2015/09/main" xmlns:a16="http://schemas.microsoft.com/office/drawing/2014/main" xmlns="" id="{FB908F03-BBCC-164B-BE54-2E836D6E7C14}"/>
               </a:ext>
             </a:extLst>
           </p:cNvPr>
@@ -1470,7 +1480,7 @@
           <p:cNvPr id="5" name="Text Placeholder 5">
             <a:extLst>
               <a:ext uri="{FF2B5EF4-FFF2-40B4-BE49-F238E27FC236}">
-                <a16:creationId xmlns="" xmlns:a16="http://schemas.microsoft.com/office/drawing/2014/main" xmlns:p159="http://schemas.microsoft.com/office/powerpoint/2015/09/main" xmlns:p15="http://schemas.microsoft.com/office/powerpoint/2012/main" xmlns:a14="http://schemas.microsoft.com/office/drawing/2010/main" xmlns:p14="http://schemas.microsoft.com/office/powerpoint/2010/main" id="{A3BE9F9B-07D9-DD4C-9CEF-250804A4145A}"/>
+                <a16:creationId xmlns:p14="http://schemas.microsoft.com/office/powerpoint/2010/main" xmlns:a14="http://schemas.microsoft.com/office/drawing/2010/main" xmlns:p15="http://schemas.microsoft.com/office/powerpoint/2012/main" xmlns:p159="http://schemas.microsoft.com/office/powerpoint/2015/09/main" xmlns:a16="http://schemas.microsoft.com/office/drawing/2014/main" xmlns="" id="{A3BE9F9B-07D9-DD4C-9CEF-250804A4145A}"/>
               </a:ext>
             </a:extLst>
           </p:cNvPr>
@@ -1486,6 +1496,9 @@
             <a:off x="929260" y="1949372"/>
             <a:ext cx="6535842" cy="643926"/>
           </a:xfrm>
+          <a:prstGeom prst="rect">
+            <a:avLst/>
+          </a:prstGeom>
         </p:spPr>
         <p:txBody>
           <a:bodyPr/>
@@ -1674,7 +1687,7 @@
           <p:cNvPr id="6" name="Text Placeholder 5">
             <a:extLst>
               <a:ext uri="{FF2B5EF4-FFF2-40B4-BE49-F238E27FC236}">
-                <a16:creationId xmlns="" xmlns:a16="http://schemas.microsoft.com/office/drawing/2014/main" xmlns:p159="http://schemas.microsoft.com/office/powerpoint/2015/09/main" xmlns:p15="http://schemas.microsoft.com/office/powerpoint/2012/main" xmlns:a14="http://schemas.microsoft.com/office/drawing/2010/main" xmlns:p14="http://schemas.microsoft.com/office/powerpoint/2010/main" id="{1878D8DD-C7E7-9345-9C0D-92472D27ADF8}"/>
+                <a16:creationId xmlns:p14="http://schemas.microsoft.com/office/powerpoint/2010/main" xmlns:a14="http://schemas.microsoft.com/office/drawing/2010/main" xmlns:p15="http://schemas.microsoft.com/office/powerpoint/2012/main" xmlns:p159="http://schemas.microsoft.com/office/powerpoint/2015/09/main" xmlns:a16="http://schemas.microsoft.com/office/drawing/2014/main" xmlns="" id="{1878D8DD-C7E7-9345-9C0D-92472D27ADF8}"/>
               </a:ext>
             </a:extLst>
           </p:cNvPr>
@@ -1690,6 +1703,9 @@
             <a:off x="929260" y="1949372"/>
             <a:ext cx="6577530" cy="643926"/>
           </a:xfrm>
+          <a:prstGeom prst="rect">
+            <a:avLst/>
+          </a:prstGeom>
         </p:spPr>
         <p:txBody>
           <a:bodyPr/>
@@ -1882,7 +1898,7 @@
           <p:cNvPr id="5" name="Text Placeholder 5">
             <a:extLst>
               <a:ext uri="{FF2B5EF4-FFF2-40B4-BE49-F238E27FC236}">
-                <a16:creationId xmlns="" xmlns:a16="http://schemas.microsoft.com/office/drawing/2014/main" xmlns:p159="http://schemas.microsoft.com/office/powerpoint/2015/09/main" xmlns:p15="http://schemas.microsoft.com/office/powerpoint/2012/main" xmlns:a14="http://schemas.microsoft.com/office/drawing/2010/main" xmlns:p14="http://schemas.microsoft.com/office/powerpoint/2010/main" id="{6BB7B2F8-0AF7-D04F-81DD-52FDB6B7326C}"/>
+                <a16:creationId xmlns:p14="http://schemas.microsoft.com/office/powerpoint/2010/main" xmlns:a14="http://schemas.microsoft.com/office/drawing/2010/main" xmlns:p15="http://schemas.microsoft.com/office/powerpoint/2012/main" xmlns:p159="http://schemas.microsoft.com/office/powerpoint/2015/09/main" xmlns:a16="http://schemas.microsoft.com/office/drawing/2014/main" xmlns="" id="{6BB7B2F8-0AF7-D04F-81DD-52FDB6B7326C}"/>
               </a:ext>
             </a:extLst>
           </p:cNvPr>
@@ -1898,6 +1914,9 @@
             <a:off x="929260" y="1949372"/>
             <a:ext cx="6535842" cy="643926"/>
           </a:xfrm>
+          <a:prstGeom prst="rect">
+            <a:avLst/>
+          </a:prstGeom>
         </p:spPr>
         <p:txBody>
           <a:bodyPr/>
@@ -1946,228 +1965,6 @@
 </file>
 
 <file path=ppt/slideLayouts/slideLayout7.xml><?xml version="1.0" encoding="utf-8"?>
-<p:sldLayout xmlns:a="http://schemas.openxmlformats.org/drawingml/2006/main" xmlns:r="http://schemas.openxmlformats.org/officeDocument/2006/relationships" xmlns:p="http://schemas.openxmlformats.org/presentationml/2006/main" userDrawn="1">
-  <p:cSld name="1_Chinese text page">
-    <p:spTree>
-      <p:nvGrpSpPr>
-        <p:cNvPr id="1" name=""/>
-        <p:cNvGrpSpPr/>
-        <p:nvPr/>
-      </p:nvGrpSpPr>
-      <p:grpSpPr>
-        <a:xfrm>
-          <a:off x="0" y="0"/>
-          <a:ext cx="0" cy="0"/>
-          <a:chOff x="0" y="0"/>
-          <a:chExt cx="0" cy="0"/>
-        </a:xfrm>
-      </p:grpSpPr>
-      <p:sp>
-        <p:nvSpPr>
-          <p:cNvPr id="3" name="Subtitle 2">
-            <a:extLst>
-              <a:ext uri="{FF2B5EF4-FFF2-40B4-BE49-F238E27FC236}">
-                <a16:creationId xmlns="" xmlns:a16="http://schemas.microsoft.com/office/drawing/2014/main" xmlns:p159="http://schemas.microsoft.com/office/powerpoint/2015/09/main" xmlns:p15="http://schemas.microsoft.com/office/powerpoint/2012/main" xmlns:a14="http://schemas.microsoft.com/office/drawing/2010/main" xmlns:p14="http://schemas.microsoft.com/office/powerpoint/2010/main" id="{D2A38214-5857-FC4E-B923-056100E16BCA}"/>
-              </a:ext>
-            </a:extLst>
-          </p:cNvPr>
-          <p:cNvSpPr>
-            <a:spLocks noGrp="1"/>
-          </p:cNvSpPr>
-          <p:nvPr>
-            <p:ph type="subTitle" idx="1" hasCustomPrompt="1"/>
-          </p:nvPr>
-        </p:nvSpPr>
-        <p:spPr>
-          <a:xfrm>
-            <a:off x="729175" y="456134"/>
-            <a:ext cx="10740640" cy="993400"/>
-          </a:xfrm>
-          <a:prstGeom prst="rect">
-            <a:avLst/>
-          </a:prstGeom>
-        </p:spPr>
-        <p:txBody>
-          <a:bodyPr lIns="0" tIns="0" rIns="0" bIns="0" anchor="t">
-            <a:normAutofit/>
-          </a:bodyPr>
-          <a:lstStyle>
-            <a:lvl1pPr marL="0" indent="0" algn="l">
-              <a:lnSpc>
-                <a:spcPts val="3430"/>
-              </a:lnSpc>
-              <a:spcBef>
-                <a:spcPct val="0"/>
-              </a:spcBef>
-              <a:buNone/>
-              <a:defRPr sz="3200" baseline="0">
-                <a:solidFill>
-                  <a:schemeClr val="tx1"/>
-                </a:solidFill>
-                <a:latin typeface="Microsoft YaHei" panose="020B0503020204020204" pitchFamily="34" charset="-122"/>
-                <a:ea typeface="Microsoft YaHei" panose="020B0503020204020204" pitchFamily="34" charset="-122"/>
-              </a:defRPr>
-            </a:lvl1pPr>
-            <a:lvl2pPr marL="593900" indent="0" algn="ctr">
-              <a:buNone/>
-              <a:defRPr sz="2598"/>
-            </a:lvl2pPr>
-            <a:lvl3pPr marL="1187798" indent="0" algn="ctr">
-              <a:buNone/>
-              <a:defRPr sz="2338"/>
-            </a:lvl3pPr>
-            <a:lvl4pPr marL="1781699" indent="0" algn="ctr">
-              <a:buNone/>
-              <a:defRPr sz="2079"/>
-            </a:lvl4pPr>
-            <a:lvl5pPr marL="2375598" indent="0" algn="ctr">
-              <a:buNone/>
-              <a:defRPr sz="2079"/>
-            </a:lvl5pPr>
-            <a:lvl6pPr marL="2969497" indent="0" algn="ctr">
-              <a:buNone/>
-              <a:defRPr sz="2079"/>
-            </a:lvl6pPr>
-            <a:lvl7pPr marL="3563396" indent="0" algn="ctr">
-              <a:buNone/>
-              <a:defRPr sz="2079"/>
-            </a:lvl7pPr>
-            <a:lvl8pPr marL="4157297" indent="0" algn="ctr">
-              <a:buNone/>
-              <a:defRPr sz="2079"/>
-            </a:lvl8pPr>
-            <a:lvl9pPr marL="4751195" indent="0" algn="ctr">
-              <a:buNone/>
-              <a:defRPr sz="2079"/>
-            </a:lvl9pPr>
-          </a:lstStyle>
-          <a:p>
-            <a:r>
-              <a:rPr lang="zh-CN" altLang="en-US"/>
-              <a:t>单击此处添加标题</a:t>
-            </a:r>
-            <a:endParaRPr lang="en-US"/>
-          </a:p>
-        </p:txBody>
-      </p:sp>
-      <p:sp>
-        <p:nvSpPr>
-          <p:cNvPr id="7" name="Content Placeholder 2">
-            <a:extLst>
-              <a:ext uri="{FF2B5EF4-FFF2-40B4-BE49-F238E27FC236}">
-                <a16:creationId xmlns="" xmlns:a16="http://schemas.microsoft.com/office/drawing/2014/main" xmlns:p159="http://schemas.microsoft.com/office/powerpoint/2015/09/main" xmlns:p15="http://schemas.microsoft.com/office/powerpoint/2012/main" xmlns:a14="http://schemas.microsoft.com/office/drawing/2010/main" xmlns:p14="http://schemas.microsoft.com/office/powerpoint/2010/main" id="{8A4EAA63-3827-DA40-B921-C01084B9DA87}"/>
-              </a:ext>
-            </a:extLst>
-          </p:cNvPr>
-          <p:cNvSpPr>
-            <a:spLocks noGrp="1"/>
-          </p:cNvSpPr>
-          <p:nvPr>
-            <p:ph idx="10" hasCustomPrompt="1"/>
-          </p:nvPr>
-        </p:nvSpPr>
-        <p:spPr>
-          <a:xfrm>
-            <a:off x="736908" y="1501989"/>
-            <a:ext cx="10733557" cy="4690459"/>
-          </a:xfrm>
-          <a:prstGeom prst="rect">
-            <a:avLst/>
-          </a:prstGeom>
-        </p:spPr>
-        <p:txBody>
-          <a:bodyPr lIns="0" tIns="0" rIns="0" bIns="0"/>
-          <a:lstStyle>
-            <a:lvl1pPr marL="12373" indent="0">
-              <a:lnSpc>
-                <a:spcPct val="100000"/>
-              </a:lnSpc>
-              <a:spcBef>
-                <a:spcPct val="0"/>
-              </a:spcBef>
-              <a:buFontTx/>
-              <a:buNone/>
-              <a:tabLst>
-                <a:tab pos="1208420" algn="ctr"/>
-              </a:tabLst>
-              <a:defRPr sz="1800" baseline="0">
-                <a:solidFill>
-                  <a:schemeClr val="tx1"/>
-                </a:solidFill>
-                <a:latin typeface="Microsoft YaHei" panose="020B0503020204020204" pitchFamily="34" charset="-122"/>
-                <a:ea typeface="Microsoft YaHei" panose="020B0503020204020204" pitchFamily="34" charset="-122"/>
-                <a:cs typeface="Arial" panose="020B0604020202020204" pitchFamily="34" charset="0"/>
-              </a:defRPr>
-            </a:lvl1pPr>
-            <a:lvl2pPr marL="525850" indent="-171159">
-              <a:buFont typeface="Arial" panose="020B0604020202020204" pitchFamily="34" charset="0"/>
-              <a:buChar char="•"/>
-              <a:tabLst>
-                <a:tab pos="1208420" algn="ctr"/>
-              </a:tabLst>
-              <a:defRPr sz="1299" baseline="0"/>
-            </a:lvl2pPr>
-            <a:lvl3pPr marL="525850" indent="-171159">
-              <a:buFont typeface="Arial" panose="020B0604020202020204" pitchFamily="34" charset="0"/>
-              <a:buChar char="•"/>
-              <a:tabLst>
-                <a:tab pos="1208420" algn="ctr"/>
-              </a:tabLst>
-              <a:defRPr sz="1299" baseline="0"/>
-            </a:lvl3pPr>
-            <a:lvl4pPr marL="525850" indent="-171159">
-              <a:buFont typeface="Arial" panose="020B0604020202020204" pitchFamily="34" charset="0"/>
-              <a:buChar char="•"/>
-              <a:tabLst>
-                <a:tab pos="1208420" algn="ctr"/>
-              </a:tabLst>
-              <a:defRPr sz="1299" baseline="0"/>
-            </a:lvl4pPr>
-            <a:lvl5pPr marL="525850" indent="-171159">
-              <a:buFont typeface="Arial" panose="020B0604020202020204" pitchFamily="34" charset="0"/>
-              <a:buChar char="•"/>
-              <a:tabLst>
-                <a:tab pos="1208420" algn="ctr"/>
-              </a:tabLst>
-              <a:defRPr sz="1299" baseline="0"/>
-            </a:lvl5pPr>
-          </a:lstStyle>
-          <a:p>
-            <a:pPr lvl="0"/>
-            <a:r>
-              <a:rPr lang="zh-CN" altLang="en-US"/>
-              <a:t>单击此处添加文本</a:t>
-            </a:r>
-            <a:endParaRPr lang="en-US"/>
-          </a:p>
-        </p:txBody>
-      </p:sp>
-    </p:spTree>
-    <p:extLst>
-      <p:ext uri="{BB962C8B-B14F-4D97-AF65-F5344CB8AC3E}">
-        <p14:creationId xmlns:p14="http://schemas.microsoft.com/office/powerpoint/2010/main" val="156853069"/>
-      </p:ext>
-    </p:extLst>
-  </p:cSld>
-  <p:clrMapOvr>
-    <a:masterClrMapping/>
-  </p:clrMapOvr>
-  <p:transition/>
-  <p:extLst mod="1">
-    <p:ext uri="{DCECCB84-F9BA-43D5-87BE-67443E8EF086}">
-      <p15:sldGuideLst xmlns:p15="http://schemas.microsoft.com/office/powerpoint/2012/main">
-        <p15:guide id="1" pos="3842">
-          <p15:clr>
-            <a:srgbClr val="FBAE40"/>
-          </p15:clr>
-        </p15:guide>
-      </p15:sldGuideLst>
-    </p:ext>
-  </p:extLst>
-</p:sldLayout>
-</file>
-
-<file path=ppt/slideLayouts/slideLayout8.xml><?xml version="1.0" encoding="utf-8"?>
 <p:sldLayout xmlns:a="http://schemas.openxmlformats.org/drawingml/2006/main" xmlns:r="http://schemas.openxmlformats.org/officeDocument/2006/relationships" xmlns:p="http://schemas.openxmlformats.org/presentationml/2006/main" userDrawn="1">
   <p:cSld name="Contents Slide">
     <p:spTree>
@@ -2789,438 +2586,6 @@
           <a:chExt cx="0" cy="0"/>
         </a:xfrm>
       </p:grpSpPr>
-      <p:sp>
-        <p:nvSpPr>
-          <p:cNvPr id="15" name="Text Placeholder 14">
-            <a:extLst>
-              <a:ext uri="{FF2B5EF4-FFF2-40B4-BE49-F238E27FC236}">
-                <a16:creationId xmlns="" xmlns:a16="http://schemas.microsoft.com/office/drawing/2014/main" xmlns:p159="http://schemas.microsoft.com/office/powerpoint/2015/09/main" xmlns:p15="http://schemas.microsoft.com/office/powerpoint/2012/main" xmlns:a14="http://schemas.microsoft.com/office/drawing/2010/main" xmlns:p14="http://schemas.microsoft.com/office/powerpoint/2010/main" id="{AF72FAD7-C8C3-754A-A498-D3A7EC29AB73}"/>
-              </a:ext>
-            </a:extLst>
-          </p:cNvPr>
-          <p:cNvSpPr>
-            <a:spLocks noGrp="1"/>
-          </p:cNvSpPr>
-          <p:nvPr>
-            <p:ph type="body" idx="1"/>
-          </p:nvPr>
-        </p:nvSpPr>
-        <p:spPr>
-          <a:xfrm>
-            <a:off x="909309" y="6270651"/>
-            <a:ext cx="1982316" cy="153611"/>
-          </a:xfrm>
-          <a:prstGeom prst="rect">
-            <a:avLst/>
-          </a:prstGeom>
-        </p:spPr>
-        <p:txBody>
-          <a:bodyPr vert="horz" lIns="0" tIns="0" rIns="0" bIns="0" rtlCol="0">
-            <a:noAutofit/>
-          </a:bodyPr>
-          <a:lstStyle/>
-          <a:p>
-            <a:pPr lvl="0"/>
-            <a:r>
-              <a:rPr lang="en-US"/>
-              <a:t>Edit Master text styles</a:t>
-            </a:r>
-          </a:p>
-        </p:txBody>
-      </p:sp>
-      <p:pic>
-        <p:nvPicPr>
-          <p:cNvPr id="4" name="图片 3"/>
-          <p:cNvPicPr>
-            <a:picLocks noChangeAspect="1"/>
-          </p:cNvPicPr>
-          <p:nvPr userDrawn="1"/>
-        </p:nvPicPr>
-        <p:blipFill>
-          <a:blip r:embed="rId9">
-            <a:extLst>
-              <a:ext uri="{28A0092B-C50C-407E-A947-70E740481C1C}">
-                <a14:useLocalDpi xmlns:a14="http://schemas.microsoft.com/office/drawing/2010/main" val="0"/>
-              </a:ext>
-            </a:extLst>
-          </a:blip>
-          <a:stretch>
-            <a:fillRect/>
-          </a:stretch>
-        </p:blipFill>
-        <p:spPr>
-          <a:xfrm>
-            <a:off x="9206684" y="5970030"/>
-            <a:ext cx="2256665" cy="493531"/>
-          </a:xfrm>
-          <a:prstGeom prst="rect">
-            <a:avLst/>
-          </a:prstGeom>
-        </p:spPr>
-      </p:pic>
-    </p:spTree>
-    <p:extLst>
-      <p:ext uri="{BB962C8B-B14F-4D97-AF65-F5344CB8AC3E}">
-        <p14:creationId xmlns:p14="http://schemas.microsoft.com/office/powerpoint/2010/main" val="4087104836"/>
-      </p:ext>
-    </p:extLst>
-  </p:cSld>
-  <p:clrMap bg1="lt1" tx1="dk1" bg2="lt2" tx2="dk2" accent1="accent1" accent2="accent2" accent3="accent3" accent4="accent4" accent5="accent5" accent6="accent6" hlink="hlink" folHlink="folHlink"/>
-  <p:sldLayoutIdLst>
-    <p:sldLayoutId id="2147483819" r:id="rId1"/>
-    <p:sldLayoutId id="2147483820" r:id="rId2"/>
-    <p:sldLayoutId id="2147483822" r:id="rId3"/>
-    <p:sldLayoutId id="2147483821" r:id="rId4"/>
-    <p:sldLayoutId id="2147483823" r:id="rId5"/>
-    <p:sldLayoutId id="2147483824" r:id="rId6"/>
-    <p:sldLayoutId id="2147483899" r:id="rId7"/>
-  </p:sldLayoutIdLst>
-  <p:transition/>
-  <p:hf hdr="0" ftr="0" dt="0"/>
-  <p:txStyles>
-    <p:titleStyle>
-      <a:lvl1pPr algn="l" defTabSz="914400" rtl="0" eaLnBrk="1" latinLnBrk="0" hangingPunct="1">
-        <a:lnSpc>
-          <a:spcPts val="3440"/>
-        </a:lnSpc>
-        <a:spcBef>
-          <a:spcPct val="0"/>
-        </a:spcBef>
-        <a:buNone/>
-        <a:defRPr sz="3200" kern="1200">
-          <a:solidFill>
-            <a:schemeClr val="tx1"/>
-          </a:solidFill>
-          <a:latin typeface="Microsoft YaHei" panose="020B0503020204020204" pitchFamily="34" charset="-122"/>
-          <a:ea typeface="Microsoft YaHei" panose="020B0503020204020204" pitchFamily="34" charset="-122"/>
-          <a:cs typeface="+mj-cs"/>
-        </a:defRPr>
-      </a:lvl1pPr>
-    </p:titleStyle>
-    <p:bodyStyle>
-      <a:lvl1pPr marL="0" indent="0" algn="l" defTabSz="914400" rtl="0" eaLnBrk="1" latinLnBrk="0" hangingPunct="1">
-        <a:lnSpc>
-          <a:spcPct val="100000"/>
-        </a:lnSpc>
-        <a:spcBef>
-          <a:spcPct val="0"/>
-        </a:spcBef>
-        <a:buFontTx/>
-        <a:buNone/>
-        <a:defRPr sz="1000" kern="1200">
-          <a:solidFill>
-            <a:srgbClr val="1D1D1B"/>
-          </a:solidFill>
-          <a:latin typeface="Arial" panose="020B0604020202020204" pitchFamily="34" charset="0"/>
-          <a:ea typeface="Microsoft YaHei" panose="020B0503020204020204" pitchFamily="34" charset="-122"/>
-          <a:cs typeface="Arial" panose="020B0604020202020204" pitchFamily="34" charset="0"/>
-        </a:defRPr>
-      </a:lvl1pPr>
-      <a:lvl2pPr marL="457200" indent="0" algn="l" defTabSz="914400" rtl="0" eaLnBrk="1" latinLnBrk="0" hangingPunct="1">
-        <a:lnSpc>
-          <a:spcPct val="90000"/>
-        </a:lnSpc>
-        <a:spcBef>
-          <a:spcPts val="500"/>
-        </a:spcBef>
-        <a:buFontTx/>
-        <a:buNone/>
-        <a:defRPr sz="750" kern="1200">
-          <a:solidFill>
-            <a:schemeClr val="tx1"/>
-          </a:solidFill>
-          <a:latin typeface="Arial" panose="020B0604020202020204" pitchFamily="34" charset="0"/>
-          <a:ea typeface="+mn-ea"/>
-          <a:cs typeface="Arial" panose="020B0604020202020204" pitchFamily="34" charset="0"/>
-        </a:defRPr>
-      </a:lvl2pPr>
-      <a:lvl3pPr marL="914400" indent="0" algn="l" defTabSz="914400" rtl="0" eaLnBrk="1" latinLnBrk="0" hangingPunct="1">
-        <a:lnSpc>
-          <a:spcPct val="90000"/>
-        </a:lnSpc>
-        <a:spcBef>
-          <a:spcPts val="500"/>
-        </a:spcBef>
-        <a:buFontTx/>
-        <a:buNone/>
-        <a:defRPr sz="750" kern="1200">
-          <a:solidFill>
-            <a:schemeClr val="tx1"/>
-          </a:solidFill>
-          <a:latin typeface="Arial" panose="020B0604020202020204" pitchFamily="34" charset="0"/>
-          <a:ea typeface="+mn-ea"/>
-          <a:cs typeface="Arial" panose="020B0604020202020204" pitchFamily="34" charset="0"/>
-        </a:defRPr>
-      </a:lvl3pPr>
-      <a:lvl4pPr marL="1371600" indent="0" algn="l" defTabSz="914400" rtl="0" eaLnBrk="1" latinLnBrk="0" hangingPunct="1">
-        <a:lnSpc>
-          <a:spcPct val="90000"/>
-        </a:lnSpc>
-        <a:spcBef>
-          <a:spcPts val="500"/>
-        </a:spcBef>
-        <a:buFontTx/>
-        <a:buNone/>
-        <a:defRPr sz="750" kern="1200">
-          <a:solidFill>
-            <a:schemeClr val="tx1"/>
-          </a:solidFill>
-          <a:latin typeface="Arial" panose="020B0604020202020204" pitchFamily="34" charset="0"/>
-          <a:ea typeface="+mn-ea"/>
-          <a:cs typeface="Arial" panose="020B0604020202020204" pitchFamily="34" charset="0"/>
-        </a:defRPr>
-      </a:lvl4pPr>
-      <a:lvl5pPr marL="1828800" indent="0" algn="l" defTabSz="914400" rtl="0" eaLnBrk="1" latinLnBrk="0" hangingPunct="1">
-        <a:lnSpc>
-          <a:spcPct val="90000"/>
-        </a:lnSpc>
-        <a:spcBef>
-          <a:spcPts val="500"/>
-        </a:spcBef>
-        <a:buFontTx/>
-        <a:buNone/>
-        <a:defRPr sz="750" kern="1200">
-          <a:solidFill>
-            <a:schemeClr val="tx1"/>
-          </a:solidFill>
-          <a:latin typeface="Arial" panose="020B0604020202020204" pitchFamily="34" charset="0"/>
-          <a:ea typeface="+mn-ea"/>
-          <a:cs typeface="Arial" panose="020B0604020202020204" pitchFamily="34" charset="0"/>
-        </a:defRPr>
-      </a:lvl5pPr>
-      <a:lvl6pPr marL="2514600" indent="-228600" algn="l" defTabSz="914400" rtl="0" eaLnBrk="1" latinLnBrk="0" hangingPunct="1">
-        <a:lnSpc>
-          <a:spcPct val="90000"/>
-        </a:lnSpc>
-        <a:spcBef>
-          <a:spcPts val="500"/>
-        </a:spcBef>
-        <a:buFont typeface="Arial" panose="020B0604020202020204" pitchFamily="34" charset="0"/>
-        <a:buChar char="•"/>
-        <a:defRPr sz="1800" kern="1200">
-          <a:solidFill>
-            <a:schemeClr val="tx1"/>
-          </a:solidFill>
-          <a:latin typeface="+mn-lt"/>
-          <a:ea typeface="+mn-ea"/>
-          <a:cs typeface="+mn-cs"/>
-        </a:defRPr>
-      </a:lvl6pPr>
-      <a:lvl7pPr marL="2971800" indent="-228600" algn="l" defTabSz="914400" rtl="0" eaLnBrk="1" latinLnBrk="0" hangingPunct="1">
-        <a:lnSpc>
-          <a:spcPct val="90000"/>
-        </a:lnSpc>
-        <a:spcBef>
-          <a:spcPts val="500"/>
-        </a:spcBef>
-        <a:buFont typeface="Arial" panose="020B0604020202020204" pitchFamily="34" charset="0"/>
-        <a:buChar char="•"/>
-        <a:defRPr sz="1800" kern="1200">
-          <a:solidFill>
-            <a:schemeClr val="tx1"/>
-          </a:solidFill>
-          <a:latin typeface="+mn-lt"/>
-          <a:ea typeface="+mn-ea"/>
-          <a:cs typeface="+mn-cs"/>
-        </a:defRPr>
-      </a:lvl7pPr>
-      <a:lvl8pPr marL="3429000" indent="-228600" algn="l" defTabSz="914400" rtl="0" eaLnBrk="1" latinLnBrk="0" hangingPunct="1">
-        <a:lnSpc>
-          <a:spcPct val="90000"/>
-        </a:lnSpc>
-        <a:spcBef>
-          <a:spcPts val="500"/>
-        </a:spcBef>
-        <a:buFont typeface="Arial" panose="020B0604020202020204" pitchFamily="34" charset="0"/>
-        <a:buChar char="•"/>
-        <a:defRPr sz="1800" kern="1200">
-          <a:solidFill>
-            <a:schemeClr val="tx1"/>
-          </a:solidFill>
-          <a:latin typeface="+mn-lt"/>
-          <a:ea typeface="+mn-ea"/>
-          <a:cs typeface="+mn-cs"/>
-        </a:defRPr>
-      </a:lvl8pPr>
-      <a:lvl9pPr marL="3886200" indent="-228600" algn="l" defTabSz="914400" rtl="0" eaLnBrk="1" latinLnBrk="0" hangingPunct="1">
-        <a:lnSpc>
-          <a:spcPct val="90000"/>
-        </a:lnSpc>
-        <a:spcBef>
-          <a:spcPts val="500"/>
-        </a:spcBef>
-        <a:buFont typeface="Arial" panose="020B0604020202020204" pitchFamily="34" charset="0"/>
-        <a:buChar char="•"/>
-        <a:defRPr sz="1800" kern="1200">
-          <a:solidFill>
-            <a:schemeClr val="tx1"/>
-          </a:solidFill>
-          <a:latin typeface="+mn-lt"/>
-          <a:ea typeface="+mn-ea"/>
-          <a:cs typeface="+mn-cs"/>
-        </a:defRPr>
-      </a:lvl9pPr>
-    </p:bodyStyle>
-    <p:otherStyle>
-      <a:defPPr>
-        <a:defRPr lang="en-US"/>
-      </a:defPPr>
-      <a:lvl1pPr marL="0" algn="l" defTabSz="914400" rtl="0" eaLnBrk="1" latinLnBrk="0" hangingPunct="1">
-        <a:defRPr sz="1800" kern="1200">
-          <a:solidFill>
-            <a:schemeClr val="tx1"/>
-          </a:solidFill>
-          <a:latin typeface="+mn-lt"/>
-          <a:ea typeface="+mn-ea"/>
-          <a:cs typeface="+mn-cs"/>
-        </a:defRPr>
-      </a:lvl1pPr>
-      <a:lvl2pPr marL="457200" algn="l" defTabSz="914400" rtl="0" eaLnBrk="1" latinLnBrk="0" hangingPunct="1">
-        <a:defRPr sz="1800" kern="1200">
-          <a:solidFill>
-            <a:schemeClr val="tx1"/>
-          </a:solidFill>
-          <a:latin typeface="+mn-lt"/>
-          <a:ea typeface="+mn-ea"/>
-          <a:cs typeface="+mn-cs"/>
-        </a:defRPr>
-      </a:lvl2pPr>
-      <a:lvl3pPr marL="914400" algn="l" defTabSz="914400" rtl="0" eaLnBrk="1" latinLnBrk="0" hangingPunct="1">
-        <a:defRPr sz="1800" kern="1200">
-          <a:solidFill>
-            <a:schemeClr val="tx1"/>
-          </a:solidFill>
-          <a:latin typeface="+mn-lt"/>
-          <a:ea typeface="+mn-ea"/>
-          <a:cs typeface="+mn-cs"/>
-        </a:defRPr>
-      </a:lvl3pPr>
-      <a:lvl4pPr marL="1371600" algn="l" defTabSz="914400" rtl="0" eaLnBrk="1" latinLnBrk="0" hangingPunct="1">
-        <a:defRPr sz="1800" kern="1200">
-          <a:solidFill>
-            <a:schemeClr val="tx1"/>
-          </a:solidFill>
-          <a:latin typeface="+mn-lt"/>
-          <a:ea typeface="+mn-ea"/>
-          <a:cs typeface="+mn-cs"/>
-        </a:defRPr>
-      </a:lvl4pPr>
-      <a:lvl5pPr marL="1828800" algn="l" defTabSz="914400" rtl="0" eaLnBrk="1" latinLnBrk="0" hangingPunct="1">
-        <a:defRPr sz="1800" kern="1200">
-          <a:solidFill>
-            <a:schemeClr val="tx1"/>
-          </a:solidFill>
-          <a:latin typeface="+mn-lt"/>
-          <a:ea typeface="+mn-ea"/>
-          <a:cs typeface="+mn-cs"/>
-        </a:defRPr>
-      </a:lvl5pPr>
-      <a:lvl6pPr marL="2286000" algn="l" defTabSz="914400" rtl="0" eaLnBrk="1" latinLnBrk="0" hangingPunct="1">
-        <a:defRPr sz="1800" kern="1200">
-          <a:solidFill>
-            <a:schemeClr val="tx1"/>
-          </a:solidFill>
-          <a:latin typeface="+mn-lt"/>
-          <a:ea typeface="+mn-ea"/>
-          <a:cs typeface="+mn-cs"/>
-        </a:defRPr>
-      </a:lvl6pPr>
-      <a:lvl7pPr marL="2743200" algn="l" defTabSz="914400" rtl="0" eaLnBrk="1" latinLnBrk="0" hangingPunct="1">
-        <a:defRPr sz="1800" kern="1200">
-          <a:solidFill>
-            <a:schemeClr val="tx1"/>
-          </a:solidFill>
-          <a:latin typeface="+mn-lt"/>
-          <a:ea typeface="+mn-ea"/>
-          <a:cs typeface="+mn-cs"/>
-        </a:defRPr>
-      </a:lvl7pPr>
-      <a:lvl8pPr marL="3200400" algn="l" defTabSz="914400" rtl="0" eaLnBrk="1" latinLnBrk="0" hangingPunct="1">
-        <a:defRPr sz="1800" kern="1200">
-          <a:solidFill>
-            <a:schemeClr val="tx1"/>
-          </a:solidFill>
-          <a:latin typeface="+mn-lt"/>
-          <a:ea typeface="+mn-ea"/>
-          <a:cs typeface="+mn-cs"/>
-        </a:defRPr>
-      </a:lvl8pPr>
-      <a:lvl9pPr marL="3657600" algn="l" defTabSz="914400" rtl="0" eaLnBrk="1" latinLnBrk="0" hangingPunct="1">
-        <a:defRPr sz="1800" kern="1200">
-          <a:solidFill>
-            <a:schemeClr val="tx1"/>
-          </a:solidFill>
-          <a:latin typeface="+mn-lt"/>
-          <a:ea typeface="+mn-ea"/>
-          <a:cs typeface="+mn-cs"/>
-        </a:defRPr>
-      </a:lvl9pPr>
-    </p:otherStyle>
-  </p:txStyles>
-  <p:extLst mod="1">
-    <p:ext uri="{27BBF7A9-308A-43DC-89C8-2F10F3537804}">
-      <p15:sldGuideLst xmlns:p15="http://schemas.microsoft.com/office/powerpoint/2012/main">
-        <p15:guide id="1" orient="horz" pos="2159" userDrawn="1">
-          <p15:clr>
-            <a:srgbClr val="F26B43"/>
-          </p15:clr>
-        </p15:guide>
-        <p15:guide id="2" pos="3841" userDrawn="1">
-          <p15:clr>
-            <a:srgbClr val="F26B43"/>
-          </p15:clr>
-        </p15:guide>
-        <p15:guide id="3" pos="565" userDrawn="1">
-          <p15:clr>
-            <a:srgbClr val="F26B43"/>
-          </p15:clr>
-        </p15:guide>
-        <p15:guide id="4" orient="horz" pos="4007" userDrawn="1">
-          <p15:clr>
-            <a:srgbClr val="F26B43"/>
-          </p15:clr>
-        </p15:guide>
-        <p15:guide id="5" orient="horz" pos="1235" userDrawn="1">
-          <p15:clr>
-            <a:srgbClr val="F26B43"/>
-          </p15:clr>
-        </p15:guide>
-        <p15:guide id="6" orient="horz" pos="553" userDrawn="1">
-          <p15:clr>
-            <a:srgbClr val="F26B43"/>
-          </p15:clr>
-        </p15:guide>
-      </p15:sldGuideLst>
-    </p:ext>
-  </p:extLst>
-</p:sldMaster>
-</file>
-
-<file path=ppt/slideMasters/slideMaster2.xml><?xml version="1.0" encoding="utf-8"?>
-<p:sldMaster xmlns:a="http://schemas.openxmlformats.org/drawingml/2006/main" xmlns:r="http://schemas.openxmlformats.org/officeDocument/2006/relationships" xmlns:p="http://schemas.openxmlformats.org/presentationml/2006/main">
-  <p:cSld>
-    <p:bg>
-      <p:bgPr>
-        <a:solidFill>
-          <a:srgbClr val="FFFFFF"/>
-        </a:solidFill>
-        <a:effectLst/>
-      </p:bgPr>
-    </p:bg>
-    <p:spTree>
-      <p:nvGrpSpPr>
-        <p:cNvPr id="1" name=""/>
-        <p:cNvGrpSpPr/>
-        <p:nvPr/>
-      </p:nvGrpSpPr>
-      <p:grpSpPr>
-        <a:xfrm>
-          <a:off x="0" y="0"/>
-          <a:ext cx="0" cy="0"/>
-          <a:chOff x="0" y="0"/>
-          <a:chExt cx="0" cy="0"/>
-        </a:xfrm>
-      </p:grpSpPr>
     </p:spTree>
     <p:extLst>
       <p:ext uri="{BB962C8B-B14F-4D97-AF65-F5344CB8AC3E}">
@@ -3229,6 +2594,14 @@
     </p:extLst>
   </p:cSld>
   <p:clrMap bg1="lt1" tx1="dk1" bg2="lt2" tx2="dk2" accent1="accent1" accent2="accent2" accent3="accent3" accent4="accent4" accent5="accent5" accent6="accent6" hlink="hlink" folHlink="folHlink"/>
+  <p:sldLayoutIdLst>
+    <p:sldLayoutId id="2147483901" r:id="rId1"/>
+    <p:sldLayoutId id="2147483820" r:id="rId2"/>
+    <p:sldLayoutId id="2147483822" r:id="rId3"/>
+    <p:sldLayoutId id="2147483821" r:id="rId4"/>
+    <p:sldLayoutId id="2147483823" r:id="rId5"/>
+    <p:sldLayoutId id="2147483824" r:id="rId6"/>
+  </p:sldLayoutIdLst>
   <p:transition/>
   <p:hf hdr="0" ftr="0" dt="0"/>
   <p:txStyles>
@@ -3545,7 +2918,7 @@
 </p:sldMaster>
 </file>
 
-<file path=ppt/slideMasters/slideMaster3.xml><?xml version="1.0" encoding="utf-8"?>
+<file path=ppt/slideMasters/slideMaster2.xml><?xml version="1.0" encoding="utf-8"?>
 <p:sldMaster xmlns:a="http://schemas.openxmlformats.org/drawingml/2006/main" xmlns:r="http://schemas.openxmlformats.org/officeDocument/2006/relationships" xmlns:p="http://schemas.openxmlformats.org/presentationml/2006/main">
   <p:cSld>
     <p:bg>
@@ -4197,7 +3570,7 @@
       </p:grpSpPr>
       <p:sp>
         <p:nvSpPr>
-          <p:cNvPr id="9" name="标题 8"/>
+          <p:cNvPr id="2" name="Title 1"/>
           <p:cNvSpPr>
             <a:spLocks noGrp="1"/>
           </p:cNvSpPr>
@@ -4205,12 +3578,7 @@
             <p:ph type="ctrTitle"/>
           </p:nvPr>
         </p:nvSpPr>
-        <p:spPr>
-          <a:xfrm>
-            <a:off x="869233" y="1146383"/>
-            <a:ext cx="8533559" cy="690255"/>
-          </a:xfrm>
-        </p:spPr>
+        <p:spPr/>
         <p:txBody>
           <a:bodyPr>
             <a:normAutofit fontScale="90000"/>
@@ -4219,175 +3587,23 @@
           <a:p>
             <a:r>
               <a:rPr lang="en-US" dirty="0" smtClean="0"/>
-              <a:t>USER TO USER DISTANACE CALCULATION USING MULTI-GPUS</a:t>
+              <a:t>GPU BASED DISTANCE CALCULATION USING MULTI-GPU</a:t>
             </a:r>
             <a:endParaRPr lang="en-IN" dirty="0"/>
-          </a:p>
-        </p:txBody>
-      </p:sp>
-      <p:sp>
-        <p:nvSpPr>
-          <p:cNvPr id="4" name="Text Placeholder 3">
-            <a:extLst>
-              <a:ext uri="{FF2B5EF4-FFF2-40B4-BE49-F238E27FC236}">
-                <a16:creationId xmlns:a16="http://schemas.microsoft.com/office/drawing/2014/main" xmlns="" xmlns:lc="http://schemas.openxmlformats.org/drawingml/2006/lockedCanvas" xmlns:p159="http://schemas.microsoft.com/office/powerpoint/2015/09/main" xmlns:p15="http://schemas.microsoft.com/office/powerpoint/2012/main" xmlns:a14="http://schemas.microsoft.com/office/drawing/2010/main" xmlns:p14="http://schemas.microsoft.com/office/powerpoint/2010/main" id="{AF19B9EA-773D-FD4C-8380-847E27C61BE5}"/>
-              </a:ext>
-            </a:extLst>
-          </p:cNvPr>
-          <p:cNvSpPr txBox="1"/>
-          <p:nvPr/>
-        </p:nvSpPr>
-        <p:spPr>
-          <a:xfrm>
-            <a:off x="948808" y="6264112"/>
-            <a:ext cx="2606870" cy="136693"/>
-          </a:xfrm>
-          <a:prstGeom prst="rect">
-            <a:avLst/>
-          </a:prstGeom>
-        </p:spPr>
-        <p:txBody>
-          <a:bodyPr vert="horz" lIns="0" tIns="0" rIns="0" bIns="0" rtlCol="0">
-            <a:noAutofit/>
-          </a:bodyPr>
-          <a:lstStyle>
-            <a:defPPr>
-              <a:defRPr lang="en-US"/>
-            </a:defPPr>
-            <a:lvl1pPr marL="0" algn="l" defTabSz="914478" rtl="0" eaLnBrk="1" latinLnBrk="0" hangingPunct="1">
-              <a:defRPr sz="1800" kern="1200">
-                <a:solidFill>
-                  <a:schemeClr val="tx1"/>
-                </a:solidFill>
-                <a:latin typeface="+mn-lt"/>
-                <a:ea typeface="+mn-ea"/>
-                <a:cs typeface="+mn-cs"/>
-              </a:defRPr>
-            </a:lvl1pPr>
-            <a:lvl2pPr marL="457240" algn="l" defTabSz="914478" rtl="0" eaLnBrk="1" latinLnBrk="0" hangingPunct="1">
-              <a:defRPr sz="1800" kern="1200">
-                <a:solidFill>
-                  <a:schemeClr val="tx1"/>
-                </a:solidFill>
-                <a:latin typeface="+mn-lt"/>
-                <a:ea typeface="+mn-ea"/>
-                <a:cs typeface="+mn-cs"/>
-              </a:defRPr>
-            </a:lvl2pPr>
-            <a:lvl3pPr marL="914478" algn="l" defTabSz="914478" rtl="0" eaLnBrk="1" latinLnBrk="0" hangingPunct="1">
-              <a:defRPr sz="1800" kern="1200">
-                <a:solidFill>
-                  <a:schemeClr val="tx1"/>
-                </a:solidFill>
-                <a:latin typeface="+mn-lt"/>
-                <a:ea typeface="+mn-ea"/>
-                <a:cs typeface="+mn-cs"/>
-              </a:defRPr>
-            </a:lvl3pPr>
-            <a:lvl4pPr marL="1371718" algn="l" defTabSz="914478" rtl="0" eaLnBrk="1" latinLnBrk="0" hangingPunct="1">
-              <a:defRPr sz="1800" kern="1200">
-                <a:solidFill>
-                  <a:schemeClr val="tx1"/>
-                </a:solidFill>
-                <a:latin typeface="+mn-lt"/>
-                <a:ea typeface="+mn-ea"/>
-                <a:cs typeface="+mn-cs"/>
-              </a:defRPr>
-            </a:lvl4pPr>
-            <a:lvl5pPr marL="1828957" algn="l" defTabSz="914478" rtl="0" eaLnBrk="1" latinLnBrk="0" hangingPunct="1">
-              <a:defRPr sz="1800" kern="1200">
-                <a:solidFill>
-                  <a:schemeClr val="tx1"/>
-                </a:solidFill>
-                <a:latin typeface="+mn-lt"/>
-                <a:ea typeface="+mn-ea"/>
-                <a:cs typeface="+mn-cs"/>
-              </a:defRPr>
-            </a:lvl5pPr>
-            <a:lvl6pPr marL="2286196" algn="l" defTabSz="914478" rtl="0" eaLnBrk="1" latinLnBrk="0" hangingPunct="1">
-              <a:defRPr sz="1800" kern="1200">
-                <a:solidFill>
-                  <a:schemeClr val="tx1"/>
-                </a:solidFill>
-                <a:latin typeface="+mn-lt"/>
-                <a:ea typeface="+mn-ea"/>
-                <a:cs typeface="+mn-cs"/>
-              </a:defRPr>
-            </a:lvl6pPr>
-            <a:lvl7pPr marL="2743435" algn="l" defTabSz="914478" rtl="0" eaLnBrk="1" latinLnBrk="0" hangingPunct="1">
-              <a:defRPr sz="1800" kern="1200">
-                <a:solidFill>
-                  <a:schemeClr val="tx1"/>
-                </a:solidFill>
-                <a:latin typeface="+mn-lt"/>
-                <a:ea typeface="+mn-ea"/>
-                <a:cs typeface="+mn-cs"/>
-              </a:defRPr>
-            </a:lvl7pPr>
-            <a:lvl8pPr marL="3200675" algn="l" defTabSz="914478" rtl="0" eaLnBrk="1" latinLnBrk="0" hangingPunct="1">
-              <a:defRPr sz="1800" kern="1200">
-                <a:solidFill>
-                  <a:schemeClr val="tx1"/>
-                </a:solidFill>
-                <a:latin typeface="+mn-lt"/>
-                <a:ea typeface="+mn-ea"/>
-                <a:cs typeface="+mn-cs"/>
-              </a:defRPr>
-            </a:lvl8pPr>
-            <a:lvl9pPr marL="3657913" algn="l" defTabSz="914478" rtl="0" eaLnBrk="1" latinLnBrk="0" hangingPunct="1">
-              <a:defRPr sz="1800" kern="1200">
-                <a:solidFill>
-                  <a:schemeClr val="tx1"/>
-                </a:solidFill>
-                <a:latin typeface="+mn-lt"/>
-                <a:ea typeface="+mn-ea"/>
-                <a:cs typeface="+mn-cs"/>
-              </a:defRPr>
-            </a:lvl9pPr>
-          </a:lstStyle>
-          <a:p>
-            <a:pPr>
-              <a:lnSpc>
-                <a:spcPct val="100000"/>
-              </a:lnSpc>
-            </a:pPr>
-            <a:r>
-              <a:rPr kumimoji="1" lang="en-US" altLang="zh-CN" sz="1000"/>
-              <a:t>Security Level:</a:t>
-            </a:r>
-            <a:endParaRPr lang="en-US" sz="1000"/>
           </a:p>
         </p:txBody>
       </p:sp>
     </p:spTree>
     <p:extLst>
       <p:ext uri="{BB962C8B-B14F-4D97-AF65-F5344CB8AC3E}">
-        <p14:creationId xmlns:p14="http://schemas.microsoft.com/office/powerpoint/2010/main" val="3632952334"/>
+        <p14:creationId xmlns:p14="http://schemas.microsoft.com/office/powerpoint/2010/main" val="2989654038"/>
       </p:ext>
     </p:extLst>
   </p:cSld>
   <p:clrMapOvr>
     <a:masterClrMapping/>
   </p:clrMapOvr>
-  <mc:AlternateContent xmlns:mc="http://schemas.openxmlformats.org/markup-compatibility/2006" xmlns:p14="http://schemas.microsoft.com/office/powerpoint/2010/main">
-    <mc:Choice Requires="p14">
-      <p:transition spd="med" p14:dur="700">
-        <p:fade/>
-      </p:transition>
-    </mc:Choice>
-    <mc:Fallback xmlns:p159="http://schemas.microsoft.com/office/powerpoint/2015/09/main" xmlns:p15="http://schemas.microsoft.com/office/powerpoint/2012/main" xmlns:a14="http://schemas.microsoft.com/office/drawing/2010/main" xmlns="">
-      <p:transition spd="med">
-        <p:fade/>
-      </p:transition>
-    </mc:Fallback>
-  </mc:AlternateContent>
-  <p:timing>
-    <p:tnLst>
-      <p:par>
-        <p:cTn id="1" dur="indefinite" restart="never" nodeType="tmRoot"/>
-      </p:par>
-    </p:tnLst>
-  </p:timing>
+  <p:transition/>
 </p:sld>
 </file>
 
@@ -4432,7 +3648,6 @@
               <a:rPr lang="en-US" dirty="0" smtClean="0"/>
               <a:t>Methodology</a:t>
             </a:r>
-            <a:endParaRPr lang="en-US" dirty="0" smtClean="0"/>
           </a:p>
           <a:p>
             <a:endParaRPr lang="en-IN" dirty="0"/>
@@ -5195,324 +4410,6 @@
 </file>
 
 <file path=ppt/theme/theme1.xml><?xml version="1.0" encoding="utf-8"?>
-<a:theme xmlns:a="http://schemas.openxmlformats.org/drawingml/2006/main" name="1_Title Slide">
-  <a:themeElements>
-    <a:clrScheme name="2210">
-      <a:dk1>
-        <a:srgbClr val="1D1D1A"/>
-      </a:dk1>
-      <a:lt1>
-        <a:srgbClr val="1D1D1A"/>
-      </a:lt1>
-      <a:dk2>
-        <a:srgbClr val="FFFFFF"/>
-      </a:dk2>
-      <a:lt2>
-        <a:srgbClr val="FFFFFF"/>
-      </a:lt2>
-      <a:accent1>
-        <a:srgbClr val="C7000A"/>
-      </a:accent1>
-      <a:accent2>
-        <a:srgbClr val="E9002F"/>
-      </a:accent2>
-      <a:accent3>
-        <a:srgbClr val="F4A100"/>
-      </a:accent3>
-      <a:accent4>
-        <a:srgbClr val="FFFF00"/>
-      </a:accent4>
-      <a:accent5>
-        <a:srgbClr val="232323"/>
-      </a:accent5>
-      <a:accent6>
-        <a:srgbClr val="666666"/>
-      </a:accent6>
-      <a:hlink>
-        <a:srgbClr val="919191"/>
-      </a:hlink>
-      <a:folHlink>
-        <a:srgbClr val="C4C4C4"/>
-      </a:folHlink>
-    </a:clrScheme>
-    <a:fontScheme name="Arial Black-Arial">
-      <a:majorFont>
-        <a:latin typeface="Arial Black" panose="020B0A04020102020204"/>
-        <a:ea typeface="Arial"/>
-        <a:cs typeface="Arial"/>
-        <a:font script="Jpan" typeface="ＭＳ ゴシック"/>
-        <a:font script="Hang" typeface="굴림"/>
-        <a:font script="Hans" typeface="微软雅黑"/>
-        <a:font script="Hant" typeface="微軟正黑體"/>
-        <a:font script="Arab" typeface="Tahoma"/>
-        <a:font script="Hebr" typeface="Tahoma"/>
-        <a:font script="Thai" typeface="FreesiaUPC"/>
-        <a:font script="Ethi" typeface="Nyala"/>
-        <a:font script="Beng" typeface="Vrinda"/>
-        <a:font script="Gujr" typeface="Shruti"/>
-        <a:font script="Khmr" typeface="DaunPenh"/>
-        <a:font script="Knda" typeface="Tunga"/>
-        <a:font script="Guru" typeface="Raavi"/>
-        <a:font script="Cans" typeface="Euphemia"/>
-        <a:font script="Cher" typeface="Plantagenet Cherokee"/>
-        <a:font script="Yiii" typeface="Microsoft Yi Baiti"/>
-        <a:font script="Tibt" typeface="Microsoft Himalaya"/>
-        <a:font script="Thaa" typeface="MV Boli"/>
-        <a:font script="Deva" typeface="Mangal"/>
-        <a:font script="Telu" typeface="Gautami"/>
-        <a:font script="Taml" typeface="Latha"/>
-        <a:font script="Syrc" typeface="Estrangelo Edessa"/>
-        <a:font script="Orya" typeface="Kalinga"/>
-        <a:font script="Mlym" typeface="Kartika"/>
-        <a:font script="Laoo" typeface="DokChampa"/>
-        <a:font script="Sinh" typeface="Iskoola Pota"/>
-        <a:font script="Mong" typeface="Mongolian Baiti"/>
-        <a:font script="Viet" typeface="Verdana"/>
-        <a:font script="Uigh" typeface="Microsoft Uighur"/>
-        <a:font script="Geor" typeface="Sylfaen"/>
-      </a:majorFont>
-      <a:minorFont>
-        <a:latin typeface="Arial"/>
-        <a:ea typeface="Arial"/>
-        <a:cs typeface="Arial"/>
-        <a:font script="Jpan" typeface="ＭＳ Ｐゴシック"/>
-        <a:font script="Hang" typeface="굴림"/>
-        <a:font script="Hans" typeface="黑体"/>
-        <a:font script="Hant" typeface="微軟正黑體"/>
-        <a:font script="Arab" typeface="Arial"/>
-        <a:font script="Hebr" typeface="Arial"/>
-        <a:font script="Thai" typeface="Cordia New"/>
-        <a:font script="Ethi" typeface="Nyala"/>
-        <a:font script="Beng" typeface="Vrinda"/>
-        <a:font script="Gujr" typeface="Shruti"/>
-        <a:font script="Khmr" typeface="DaunPenh"/>
-        <a:font script="Knda" typeface="Tunga"/>
-        <a:font script="Guru" typeface="Raavi"/>
-        <a:font script="Cans" typeface="Euphemia"/>
-        <a:font script="Cher" typeface="Plantagenet Cherokee"/>
-        <a:font script="Yiii" typeface="Microsoft Yi Baiti"/>
-        <a:font script="Tibt" typeface="Microsoft Himalaya"/>
-        <a:font script="Thaa" typeface="MV Boli"/>
-        <a:font script="Deva" typeface="Mangal"/>
-        <a:font script="Telu" typeface="Gautami"/>
-        <a:font script="Taml" typeface="Latha"/>
-        <a:font script="Syrc" typeface="Estrangelo Edessa"/>
-        <a:font script="Orya" typeface="Kalinga"/>
-        <a:font script="Mlym" typeface="Kartika"/>
-        <a:font script="Laoo" typeface="DokChampa"/>
-        <a:font script="Sinh" typeface="Iskoola Pota"/>
-        <a:font script="Mong" typeface="Mongolian Baiti"/>
-        <a:font script="Viet" typeface="Arial"/>
-        <a:font script="Uigh" typeface="Microsoft Uighur"/>
-        <a:font script="Geor" typeface="Sylfaen"/>
-      </a:minorFont>
-    </a:fontScheme>
-    <a:fmtScheme name="Office">
-      <a:fillStyleLst>
-        <a:solidFill>
-          <a:schemeClr val="phClr"/>
-        </a:solidFill>
-        <a:gradFill rotWithShape="1">
-          <a:gsLst>
-            <a:gs pos="0">
-              <a:schemeClr val="phClr">
-                <a:lumMod val="110000"/>
-                <a:satMod val="105000"/>
-                <a:tint val="67000"/>
-              </a:schemeClr>
-            </a:gs>
-            <a:gs pos="50000">
-              <a:schemeClr val="phClr">
-                <a:lumMod val="105000"/>
-                <a:satMod val="103000"/>
-                <a:tint val="73000"/>
-              </a:schemeClr>
-            </a:gs>
-            <a:gs pos="100000">
-              <a:schemeClr val="phClr">
-                <a:lumMod val="105000"/>
-                <a:satMod val="109000"/>
-                <a:tint val="81000"/>
-              </a:schemeClr>
-            </a:gs>
-          </a:gsLst>
-          <a:lin ang="5400000" scaled="0"/>
-        </a:gradFill>
-        <a:gradFill rotWithShape="1">
-          <a:gsLst>
-            <a:gs pos="0">
-              <a:schemeClr val="phClr">
-                <a:satMod val="103000"/>
-                <a:lumMod val="102000"/>
-                <a:tint val="94000"/>
-              </a:schemeClr>
-            </a:gs>
-            <a:gs pos="50000">
-              <a:schemeClr val="phClr">
-                <a:satMod val="110000"/>
-                <a:lumMod val="100000"/>
-                <a:shade val="100000"/>
-              </a:schemeClr>
-            </a:gs>
-            <a:gs pos="100000">
-              <a:schemeClr val="phClr">
-                <a:lumMod val="99000"/>
-                <a:satMod val="120000"/>
-                <a:shade val="78000"/>
-              </a:schemeClr>
-            </a:gs>
-          </a:gsLst>
-          <a:lin ang="5400000" scaled="0"/>
-        </a:gradFill>
-      </a:fillStyleLst>
-      <a:lnStyleLst>
-        <a:ln w="6350" cap="flat" cmpd="sng" algn="ctr">
-          <a:solidFill>
-            <a:schemeClr val="phClr"/>
-          </a:solidFill>
-          <a:prstDash val="solid"/>
-          <a:miter lim="800000"/>
-        </a:ln>
-        <a:ln w="12700" cap="flat" cmpd="sng" algn="ctr">
-          <a:solidFill>
-            <a:schemeClr val="phClr"/>
-          </a:solidFill>
-          <a:prstDash val="solid"/>
-          <a:miter lim="800000"/>
-        </a:ln>
-        <a:ln w="19050" cap="flat" cmpd="sng" algn="ctr">
-          <a:solidFill>
-            <a:schemeClr val="phClr"/>
-          </a:solidFill>
-          <a:prstDash val="solid"/>
-          <a:miter lim="800000"/>
-        </a:ln>
-      </a:lnStyleLst>
-      <a:effectStyleLst>
-        <a:effectStyle>
-          <a:effectLst/>
-        </a:effectStyle>
-        <a:effectStyle>
-          <a:effectLst/>
-        </a:effectStyle>
-        <a:effectStyle>
-          <a:effectLst>
-            <a:outerShdw blurRad="57150" dist="19050" dir="5400000" algn="ctr" rotWithShape="0">
-              <a:srgbClr val="000000">
-                <a:alpha val="63000"/>
-              </a:srgbClr>
-            </a:outerShdw>
-          </a:effectLst>
-        </a:effectStyle>
-      </a:effectStyleLst>
-      <a:bgFillStyleLst>
-        <a:solidFill>
-          <a:schemeClr val="phClr"/>
-        </a:solidFill>
-        <a:solidFill>
-          <a:schemeClr val="phClr">
-            <a:tint val="95000"/>
-            <a:satMod val="170000"/>
-          </a:schemeClr>
-        </a:solidFill>
-        <a:gradFill rotWithShape="1">
-          <a:gsLst>
-            <a:gs pos="0">
-              <a:schemeClr val="phClr">
-                <a:tint val="93000"/>
-                <a:satMod val="150000"/>
-                <a:shade val="98000"/>
-                <a:lumMod val="102000"/>
-              </a:schemeClr>
-            </a:gs>
-            <a:gs pos="50000">
-              <a:schemeClr val="phClr">
-                <a:tint val="98000"/>
-                <a:satMod val="130000"/>
-                <a:shade val="90000"/>
-                <a:lumMod val="103000"/>
-              </a:schemeClr>
-            </a:gs>
-            <a:gs pos="100000">
-              <a:schemeClr val="phClr">
-                <a:shade val="63000"/>
-                <a:satMod val="120000"/>
-              </a:schemeClr>
-            </a:gs>
-          </a:gsLst>
-          <a:lin ang="5400000" scaled="0"/>
-        </a:gradFill>
-      </a:bgFillStyleLst>
-    </a:fmtScheme>
-  </a:themeElements>
-  <a:objectDefaults>
-    <a:spDef>
-      <a:spPr>
-        <a:solidFill>
-          <a:schemeClr val="accent2"/>
-        </a:solidFill>
-        <a:ln>
-          <a:noFill/>
-        </a:ln>
-      </a:spPr>
-      <a:bodyPr rot="0" spcFirstLastPara="0" vertOverflow="overflow" horzOverflow="overflow" vert="horz" wrap="square" lIns="91440" tIns="45720" rIns="91440" bIns="45720" numCol="1" spcCol="0" rtlCol="0" fromWordArt="0" anchor="ctr" anchorCtr="0" forceAA="0" compatLnSpc="1">
-        <a:prstTxWarp prst="textNoShape">
-          <a:avLst/>
-        </a:prstTxWarp>
-        <a:noAutofit/>
-      </a:bodyPr>
-      <a:lstStyle>
-        <a:defPPr algn="ctr">
-          <a:defRPr dirty="0"/>
-        </a:defPPr>
-      </a:lstStyle>
-      <a:style>
-        <a:lnRef idx="2">
-          <a:schemeClr val="accent1">
-            <a:shade val="50000"/>
-          </a:schemeClr>
-        </a:lnRef>
-        <a:fillRef idx="1">
-          <a:schemeClr val="accent1"/>
-        </a:fillRef>
-        <a:effectRef idx="0">
-          <a:schemeClr val="accent1"/>
-        </a:effectRef>
-        <a:fontRef idx="minor">
-          <a:schemeClr val="lt1"/>
-        </a:fontRef>
-      </a:style>
-    </a:spDef>
-    <a:txDef>
-      <a:spPr>
-        <a:noFill/>
-      </a:spPr>
-      <a:bodyPr wrap="square" rtlCol="0">
-        <a:spAutoFit/>
-      </a:bodyPr>
-      <a:lstStyle>
-        <a:defPPr algn="l">
-          <a:defRPr kumimoji="1" sz="3200" dirty="0" smtClean="0">
-            <a:solidFill>
-              <a:srgbClr val="575756"/>
-            </a:solidFill>
-            <a:latin typeface="Microsoft YaHei" panose="020B0503020204020204" pitchFamily="34" charset="-122"/>
-            <a:ea typeface="Microsoft YaHei" panose="020B0503020204020204" pitchFamily="34" charset="-122"/>
-          </a:defRPr>
-        </a:defPPr>
-      </a:lstStyle>
-    </a:txDef>
-  </a:objectDefaults>
-  <a:extraClrSchemeLst/>
-  <a:extLst>
-    <a:ext uri="{05A4C25C-085E-4340-85A3-A5531E510DB2}">
-      <thm15:themeFamily xmlns:thm15="http://schemas.microsoft.com/office/thememl/2012/main" name="PPT模板.pptx" id="{B4542FC2-A7B2-4ED3-BB20-F6750F3E246A}" vid="{14E5A528-164A-4F9B-B3A5-57862E2D7804}"/>
-    </a:ext>
-  </a:extLst>
-</a:theme>
-</file>
-
-<file path=ppt/theme/theme2.xml><?xml version="1.0" encoding="utf-8"?>
 <a:theme xmlns:a="http://schemas.openxmlformats.org/drawingml/2006/main" name="Chart page">
   <a:themeElements>
     <a:clrScheme name="updated">
@@ -5859,7 +4756,7 @@
 </a:theme>
 </file>
 
-<file path=ppt/theme/theme3.xml><?xml version="1.0" encoding="utf-8"?>
+<file path=ppt/theme/theme2.xml><?xml version="1.0" encoding="utf-8"?>
 <a:theme xmlns:a="http://schemas.openxmlformats.org/drawingml/2006/main" name="9_主题1">
   <a:themeElements>
     <a:clrScheme name="Office">
@@ -6741,7 +5638,7 @@
 </a:theme>
 </file>
 
-<file path=ppt/theme/theme4.xml><?xml version="1.0" encoding="utf-8"?>
+<file path=ppt/theme/theme3.xml><?xml version="1.0" encoding="utf-8"?>
 <a:theme xmlns:a="http://schemas.openxmlformats.org/drawingml/2006/main" name="Office Theme">
   <a:themeElements>
     <a:clrScheme name="Office">
@@ -7036,7 +5933,7 @@
 </a:theme>
 </file>
 
-<file path=ppt/theme/theme5.xml><?xml version="1.0" encoding="utf-8"?>
+<file path=ppt/theme/theme4.xml><?xml version="1.0" encoding="utf-8"?>
 <a:theme xmlns:a="http://schemas.openxmlformats.org/drawingml/2006/main" name="Office Theme">
   <a:themeElements>
     <a:clrScheme name="Office">

</xml_diff>